<commit_message>
updated serializable dto to take a list of R objects instead of one
</commit_message>
<xml_diff>
--- a/PowerPointParser/PowerPointParserTests/TestData/v0.1_ImprovedCodingPlanFor2022.pptx
+++ b/PowerPointParser/PowerPointParserTests/TestData/v0.1_ImprovedCodingPlanFor2022.pptx
@@ -5,20 +5,22 @@
     <p:sldMasterId id="2147483663" r:id="rId1"/>
   </p:sldMasterIdLst>
   <p:notesMasterIdLst>
-    <p:notesMasterId r:id="rId3"/>
+    <p:notesMasterId r:id="rId5"/>
   </p:notesMasterIdLst>
   <p:sldIdLst>
     <p:sldId id="256" r:id="rId2"/>
+    <p:sldId id="258" r:id="rId3"/>
+    <p:sldId id="257" r:id="rId4"/>
   </p:sldIdLst>
   <p:sldSz cx="9144000" cy="5143500" type="screen16x9"/>
   <p:notesSz cx="6858000" cy="9144000"/>
   <p:embeddedFontLst>
     <p:embeddedFont>
       <p:font typeface="Helvetica Neue" panose="020B0604020202020204" charset="0"/>
-      <p:regular r:id="rId4"/>
-      <p:bold r:id="rId5"/>
-      <p:italic r:id="rId6"/>
-      <p:boldItalic r:id="rId7"/>
+      <p:regular r:id="rId6"/>
+      <p:bold r:id="rId7"/>
+      <p:italic r:id="rId8"/>
+      <p:boldItalic r:id="rId9"/>
     </p:embeddedFont>
   </p:embeddedFontLst>
   <p:defaultTextStyle>
@@ -946,6 +948,147 @@
         </p:txBody>
       </p:sp>
     </p:spTree>
+  </p:cSld>
+  <p:clrMapOvr>
+    <a:masterClrMapping/>
+  </p:clrMapOvr>
+</p:notes>
+</file>
+
+<file path=ppt/notesSlides/notesSlide2.xml><?xml version="1.0" encoding="utf-8"?>
+<p:notes xmlns:a="http://schemas.openxmlformats.org/drawingml/2006/main" xmlns:r="http://schemas.openxmlformats.org/officeDocument/2006/relationships" xmlns:p="http://schemas.openxmlformats.org/presentationml/2006/main">
+  <p:cSld>
+    <p:spTree>
+      <p:nvGrpSpPr>
+        <p:cNvPr id="1" name=""/>
+        <p:cNvGrpSpPr/>
+        <p:nvPr/>
+      </p:nvGrpSpPr>
+      <p:grpSpPr>
+        <a:xfrm>
+          <a:off x="0" y="0"/>
+          <a:ext cx="0" cy="0"/>
+          <a:chOff x="0" y="0"/>
+          <a:chExt cx="0" cy="0"/>
+        </a:xfrm>
+      </p:grpSpPr>
+      <p:sp>
+        <p:nvSpPr>
+          <p:cNvPr id="2" name="Slide Image Placeholder 1"/>
+          <p:cNvSpPr>
+            <a:spLocks noGrp="1" noRot="1" noChangeAspect="1"/>
+          </p:cNvSpPr>
+          <p:nvPr>
+            <p:ph type="sldImg"/>
+          </p:nvPr>
+        </p:nvSpPr>
+        <p:spPr/>
+      </p:sp>
+      <p:sp>
+        <p:nvSpPr>
+          <p:cNvPr id="3" name="Notes Placeholder 2"/>
+          <p:cNvSpPr>
+            <a:spLocks noGrp="1"/>
+          </p:cNvSpPr>
+          <p:nvPr>
+            <p:ph type="body" idx="1"/>
+          </p:nvPr>
+        </p:nvSpPr>
+        <p:spPr/>
+        <p:txBody>
+          <a:bodyPr/>
+          <a:lstStyle/>
+          <a:p>
+            <a:endParaRPr lang="en-US" dirty="0"/>
+          </a:p>
+        </p:txBody>
+      </p:sp>
+    </p:spTree>
+    <p:extLst>
+      <p:ext uri="{BB962C8B-B14F-4D97-AF65-F5344CB8AC3E}">
+        <p14:creationId xmlns:p14="http://schemas.microsoft.com/office/powerpoint/2010/main" val="1682211867"/>
+      </p:ext>
+    </p:extLst>
+  </p:cSld>
+  <p:clrMapOvr>
+    <a:masterClrMapping/>
+  </p:clrMapOvr>
+</p:notes>
+</file>
+
+<file path=ppt/notesSlides/notesSlide3.xml><?xml version="1.0" encoding="utf-8"?>
+<p:notes xmlns:a="http://schemas.openxmlformats.org/drawingml/2006/main" xmlns:r="http://schemas.openxmlformats.org/officeDocument/2006/relationships" xmlns:p="http://schemas.openxmlformats.org/presentationml/2006/main">
+  <p:cSld>
+    <p:spTree>
+      <p:nvGrpSpPr>
+        <p:cNvPr id="1" name=""/>
+        <p:cNvGrpSpPr/>
+        <p:nvPr/>
+      </p:nvGrpSpPr>
+      <p:grpSpPr>
+        <a:xfrm>
+          <a:off x="0" y="0"/>
+          <a:ext cx="0" cy="0"/>
+          <a:chOff x="0" y="0"/>
+          <a:chExt cx="0" cy="0"/>
+        </a:xfrm>
+      </p:grpSpPr>
+      <p:sp>
+        <p:nvSpPr>
+          <p:cNvPr id="2" name="Slide Image Placeholder 1"/>
+          <p:cNvSpPr>
+            <a:spLocks noGrp="1" noRot="1" noChangeAspect="1"/>
+          </p:cNvSpPr>
+          <p:nvPr>
+            <p:ph type="sldImg"/>
+          </p:nvPr>
+        </p:nvSpPr>
+        <p:spPr>
+          <a:xfrm>
+            <a:off x="381000" y="685800"/>
+            <a:ext cx="6096000" cy="3429000"/>
+          </a:xfrm>
+        </p:spPr>
+      </p:sp>
+      <p:sp>
+        <p:nvSpPr>
+          <p:cNvPr id="3" name="Notes Placeholder 2"/>
+          <p:cNvSpPr>
+            <a:spLocks noGrp="1"/>
+          </p:cNvSpPr>
+          <p:nvPr>
+            <p:ph type="body" idx="1"/>
+          </p:nvPr>
+        </p:nvSpPr>
+        <p:spPr/>
+        <p:txBody>
+          <a:bodyPr/>
+          <a:lstStyle/>
+          <a:p>
+            <a:pPr marL="139700" indent="0">
+              <a:buNone/>
+            </a:pPr>
+            <a:r>
+              <a:rPr lang="en-US" dirty="0"/>
+              <a:t>Ask </a:t>
+            </a:r>
+            <a:r>
+              <a:rPr lang="en-US" dirty="0" err="1"/>
+              <a:t>devs</a:t>
+            </a:r>
+            <a:r>
+              <a:rPr lang="en-US" dirty="0"/>
+              <a:t> for other examples</a:t>
+            </a:r>
+          </a:p>
+        </p:txBody>
+      </p:sp>
+    </p:spTree>
+    <p:extLst>
+      <p:ext uri="{BB962C8B-B14F-4D97-AF65-F5344CB8AC3E}">
+        <p14:creationId xmlns:p14="http://schemas.microsoft.com/office/powerpoint/2010/main" val="1907144043"/>
+      </p:ext>
+    </p:extLst>
   </p:cSld>
   <p:clrMapOvr>
     <a:masterClrMapping/>
@@ -9728,6 +9871,166 @@
 </p:sld>
 </file>
 
+<file path=ppt/slides/slide2.xml><?xml version="1.0" encoding="utf-8"?>
+<p:sld xmlns:a="http://schemas.openxmlformats.org/drawingml/2006/main" xmlns:r="http://schemas.openxmlformats.org/officeDocument/2006/relationships" xmlns:p="http://schemas.openxmlformats.org/presentationml/2006/main">
+  <p:cSld>
+    <p:spTree>
+      <p:nvGrpSpPr>
+        <p:cNvPr id="1" name=""/>
+        <p:cNvGrpSpPr/>
+        <p:nvPr/>
+      </p:nvGrpSpPr>
+      <p:grpSpPr>
+        <a:xfrm>
+          <a:off x="0" y="0"/>
+          <a:ext cx="0" cy="0"/>
+          <a:chOff x="0" y="0"/>
+          <a:chExt cx="0" cy="0"/>
+        </a:xfrm>
+      </p:grpSpPr>
+      <p:sp>
+        <p:nvSpPr>
+          <p:cNvPr id="2" name="Title 1">
+            <a:extLst>
+              <a:ext uri="{FF2B5EF4-FFF2-40B4-BE49-F238E27FC236}">
+                <a16:creationId xmlns:a16="http://schemas.microsoft.com/office/drawing/2014/main" id="{BF3F32B5-4671-47F5-BE0E-88CC292632DB}"/>
+              </a:ext>
+            </a:extLst>
+          </p:cNvPr>
+          <p:cNvSpPr>
+            <a:spLocks noGrp="1"/>
+          </p:cNvSpPr>
+          <p:nvPr>
+            <p:ph type="title"/>
+          </p:nvPr>
+        </p:nvSpPr>
+        <p:spPr/>
+        <p:txBody>
+          <a:bodyPr/>
+          <a:lstStyle/>
+          <a:p>
+            <a:endParaRPr lang="en-US"/>
+          </a:p>
+        </p:txBody>
+      </p:sp>
+      <p:sp>
+        <p:nvSpPr>
+          <p:cNvPr id="3" name="Subtitle 2">
+            <a:extLst>
+              <a:ext uri="{FF2B5EF4-FFF2-40B4-BE49-F238E27FC236}">
+                <a16:creationId xmlns:a16="http://schemas.microsoft.com/office/drawing/2014/main" id="{40ADF982-E750-419E-9714-8069DA4E7B20}"/>
+              </a:ext>
+            </a:extLst>
+          </p:cNvPr>
+          <p:cNvSpPr>
+            <a:spLocks noGrp="1"/>
+          </p:cNvSpPr>
+          <p:nvPr>
+            <p:ph type="subTitle" idx="1"/>
+          </p:nvPr>
+        </p:nvSpPr>
+        <p:spPr/>
+        <p:txBody>
+          <a:bodyPr/>
+          <a:lstStyle/>
+          <a:p>
+            <a:endParaRPr lang="en-US"/>
+          </a:p>
+        </p:txBody>
+      </p:sp>
+    </p:spTree>
+    <p:extLst>
+      <p:ext uri="{BB962C8B-B14F-4D97-AF65-F5344CB8AC3E}">
+        <p14:creationId xmlns:p14="http://schemas.microsoft.com/office/powerpoint/2010/main" val="197908347"/>
+      </p:ext>
+    </p:extLst>
+  </p:cSld>
+  <p:clrMapOvr>
+    <a:masterClrMapping/>
+  </p:clrMapOvr>
+</p:sld>
+</file>
+
+<file path=ppt/slides/slide3.xml><?xml version="1.0" encoding="utf-8"?>
+<p:sld xmlns:a="http://schemas.openxmlformats.org/drawingml/2006/main" xmlns:r="http://schemas.openxmlformats.org/officeDocument/2006/relationships" xmlns:p="http://schemas.openxmlformats.org/presentationml/2006/main">
+  <p:cSld>
+    <p:spTree>
+      <p:nvGrpSpPr>
+        <p:cNvPr id="1" name=""/>
+        <p:cNvGrpSpPr/>
+        <p:nvPr/>
+      </p:nvGrpSpPr>
+      <p:grpSpPr>
+        <a:xfrm>
+          <a:off x="0" y="0"/>
+          <a:ext cx="0" cy="0"/>
+          <a:chOff x="0" y="0"/>
+          <a:chExt cx="0" cy="0"/>
+        </a:xfrm>
+      </p:grpSpPr>
+      <p:sp>
+        <p:nvSpPr>
+          <p:cNvPr id="2" name="Title 1">
+            <a:extLst>
+              <a:ext uri="{FF2B5EF4-FFF2-40B4-BE49-F238E27FC236}">
+                <a16:creationId xmlns:a16="http://schemas.microsoft.com/office/drawing/2014/main" id="{3CBB10AC-89CC-488D-90D6-F5F8E3E27800}"/>
+              </a:ext>
+            </a:extLst>
+          </p:cNvPr>
+          <p:cNvSpPr>
+            <a:spLocks noGrp="1"/>
+          </p:cNvSpPr>
+          <p:nvPr>
+            <p:ph type="title"/>
+          </p:nvPr>
+        </p:nvSpPr>
+        <p:spPr/>
+        <p:txBody>
+          <a:bodyPr/>
+          <a:lstStyle/>
+          <a:p>
+            <a:endParaRPr lang="en-US"/>
+          </a:p>
+        </p:txBody>
+      </p:sp>
+      <p:sp>
+        <p:nvSpPr>
+          <p:cNvPr id="3" name="Subtitle 2">
+            <a:extLst>
+              <a:ext uri="{FF2B5EF4-FFF2-40B4-BE49-F238E27FC236}">
+                <a16:creationId xmlns:a16="http://schemas.microsoft.com/office/drawing/2014/main" id="{728488C3-B8A3-48AC-AA54-5C9D52C0894E}"/>
+              </a:ext>
+            </a:extLst>
+          </p:cNvPr>
+          <p:cNvSpPr>
+            <a:spLocks noGrp="1"/>
+          </p:cNvSpPr>
+          <p:nvPr>
+            <p:ph type="subTitle" idx="1"/>
+          </p:nvPr>
+        </p:nvSpPr>
+        <p:spPr/>
+        <p:txBody>
+          <a:bodyPr/>
+          <a:lstStyle/>
+          <a:p>
+            <a:endParaRPr lang="en-US"/>
+          </a:p>
+        </p:txBody>
+      </p:sp>
+    </p:spTree>
+    <p:extLst>
+      <p:ext uri="{BB962C8B-B14F-4D97-AF65-F5344CB8AC3E}">
+        <p14:creationId xmlns:p14="http://schemas.microsoft.com/office/powerpoint/2010/main" val="1142420501"/>
+      </p:ext>
+    </p:extLst>
+  </p:cSld>
+  <p:clrMapOvr>
+    <a:masterClrMapping/>
+  </p:clrMapOvr>
+</p:sld>
+</file>
+
 <file path=ppt/theme/theme1.xml><?xml version="1.0" encoding="utf-8"?>
 <a:theme xmlns:a="http://schemas.openxmlformats.org/drawingml/2006/main" name="Harmony">
   <a:themeElements>

</xml_diff>

<commit_message>
bold, lists, and paragraph pasing and tests
</commit_message>
<xml_diff>
--- a/PowerPointParser/PowerPointParserTests/TestData/v0.1_ImprovedCodingPlanFor2022.pptx
+++ b/PowerPointParser/PowerPointParserTests/TestData/v0.1_ImprovedCodingPlanFor2022.pptx
@@ -5,22 +5,23 @@
     <p:sldMasterId id="2147483663" r:id="rId1"/>
   </p:sldMasterIdLst>
   <p:notesMasterIdLst>
-    <p:notesMasterId r:id="rId5"/>
+    <p:notesMasterId r:id="rId6"/>
   </p:notesMasterIdLst>
   <p:sldIdLst>
     <p:sldId id="256" r:id="rId2"/>
     <p:sldId id="258" r:id="rId3"/>
     <p:sldId id="257" r:id="rId4"/>
+    <p:sldId id="259" r:id="rId5"/>
   </p:sldIdLst>
   <p:sldSz cx="9144000" cy="5143500" type="screen16x9"/>
   <p:notesSz cx="6858000" cy="9144000"/>
   <p:embeddedFontLst>
     <p:embeddedFont>
       <p:font typeface="Helvetica Neue" panose="020B0604020202020204" charset="0"/>
-      <p:regular r:id="rId6"/>
-      <p:bold r:id="rId7"/>
-      <p:italic r:id="rId8"/>
-      <p:boldItalic r:id="rId9"/>
+      <p:regular r:id="rId7"/>
+      <p:bold r:id="rId8"/>
+      <p:italic r:id="rId9"/>
+      <p:boldItalic r:id="rId10"/>
     </p:embeddedFont>
   </p:embeddedFontLst>
   <p:defaultTextStyle>
@@ -805,7 +806,7 @@
               <a:buNone/>
             </a:pPr>
             <a:r>
-              <a:rPr lang="en-US" b="1" dirty="0"/>
+              <a:rPr lang="en-US" b="0" dirty="0"/>
               <a:t>Intro Slide </a:t>
             </a:r>
           </a:p>
@@ -982,7 +983,12 @@
             <p:ph type="sldImg"/>
           </p:nvPr>
         </p:nvSpPr>
-        <p:spPr/>
+        <p:spPr>
+          <a:xfrm>
+            <a:off x="381000" y="685800"/>
+            <a:ext cx="6096000" cy="3429000"/>
+          </a:xfrm>
+        </p:spPr>
       </p:sp>
       <p:sp>
         <p:nvSpPr>
@@ -999,7 +1005,33 @@
           <a:bodyPr/>
           <a:lstStyle/>
           <a:p>
-            <a:endParaRPr lang="en-US" dirty="0"/>
+            <a:pPr marL="457200" indent="-317500"/>
+            <a:r>
+              <a:rPr lang="en-US" dirty="0" err="1"/>
+              <a:t>Ul</a:t>
+            </a:r>
+            <a:r>
+              <a:rPr lang="en-US" dirty="0"/>
+              <a:t> 1</a:t>
+            </a:r>
+          </a:p>
+          <a:p>
+            <a:pPr marL="457200" indent="-317500"/>
+            <a:r>
+              <a:rPr lang="en-US" dirty="0" err="1"/>
+              <a:t>Ul</a:t>
+            </a:r>
+            <a:r>
+              <a:rPr lang="en-US" dirty="0"/>
+              <a:t> 2</a:t>
+            </a:r>
+          </a:p>
+          <a:p>
+            <a:pPr marL="457200" indent="-317500"/>
+            <a:r>
+              <a:rPr lang="en-US" dirty="0"/>
+              <a:t>ul3</a:t>
+            </a:r>
           </a:p>
         </p:txBody>
       </p:sp>
@@ -1087,6 +1119,103 @@
     <p:extLst>
       <p:ext uri="{BB962C8B-B14F-4D97-AF65-F5344CB8AC3E}">
         <p14:creationId xmlns:p14="http://schemas.microsoft.com/office/powerpoint/2010/main" val="1907144043"/>
+      </p:ext>
+    </p:extLst>
+  </p:cSld>
+  <p:clrMapOvr>
+    <a:masterClrMapping/>
+  </p:clrMapOvr>
+</p:notes>
+</file>
+
+<file path=ppt/notesSlides/notesSlide4.xml><?xml version="1.0" encoding="utf-8"?>
+<p:notes xmlns:a="http://schemas.openxmlformats.org/drawingml/2006/main" xmlns:r="http://schemas.openxmlformats.org/officeDocument/2006/relationships" xmlns:p="http://schemas.openxmlformats.org/presentationml/2006/main">
+  <p:cSld>
+    <p:spTree>
+      <p:nvGrpSpPr>
+        <p:cNvPr id="1" name=""/>
+        <p:cNvGrpSpPr/>
+        <p:nvPr/>
+      </p:nvGrpSpPr>
+      <p:grpSpPr>
+        <a:xfrm>
+          <a:off x="0" y="0"/>
+          <a:ext cx="0" cy="0"/>
+          <a:chOff x="0" y="0"/>
+          <a:chExt cx="0" cy="0"/>
+        </a:xfrm>
+      </p:grpSpPr>
+      <p:sp>
+        <p:nvSpPr>
+          <p:cNvPr id="2" name="Slide Image Placeholder 1"/>
+          <p:cNvSpPr>
+            <a:spLocks noGrp="1" noRot="1" noChangeAspect="1"/>
+          </p:cNvSpPr>
+          <p:nvPr>
+            <p:ph type="sldImg"/>
+          </p:nvPr>
+        </p:nvSpPr>
+        <p:spPr>
+          <a:xfrm>
+            <a:off x="381000" y="685800"/>
+            <a:ext cx="6096000" cy="3429000"/>
+          </a:xfrm>
+        </p:spPr>
+      </p:sp>
+      <p:sp>
+        <p:nvSpPr>
+          <p:cNvPr id="3" name="Notes Placeholder 2"/>
+          <p:cNvSpPr>
+            <a:spLocks noGrp="1"/>
+          </p:cNvSpPr>
+          <p:nvPr>
+            <p:ph type="body" idx="1"/>
+          </p:nvPr>
+        </p:nvSpPr>
+        <p:spPr/>
+        <p:txBody>
+          <a:bodyPr/>
+          <a:lstStyle/>
+          <a:p>
+            <a:pPr>
+              <a:buFont typeface="+mj-lt"/>
+              <a:buAutoNum type="arabicPeriod"/>
+            </a:pPr>
+            <a:r>
+              <a:rPr lang="en-US" dirty="0" err="1"/>
+              <a:t>Ol</a:t>
+            </a:r>
+            <a:r>
+              <a:rPr lang="en-US" dirty="0"/>
+              <a:t> 1</a:t>
+            </a:r>
+          </a:p>
+          <a:p>
+            <a:pPr>
+              <a:buFont typeface="+mj-lt"/>
+              <a:buAutoNum type="arabicPeriod"/>
+            </a:pPr>
+            <a:r>
+              <a:rPr lang="en-US" dirty="0"/>
+              <a:t>Ol2</a:t>
+            </a:r>
+          </a:p>
+          <a:p>
+            <a:pPr>
+              <a:buFont typeface="+mj-lt"/>
+              <a:buAutoNum type="arabicPeriod"/>
+            </a:pPr>
+            <a:r>
+              <a:rPr lang="en-US" dirty="0"/>
+              <a:t>ol3</a:t>
+            </a:r>
+          </a:p>
+        </p:txBody>
+      </p:sp>
+    </p:spTree>
+    <p:extLst>
+      <p:ext uri="{BB962C8B-B14F-4D97-AF65-F5344CB8AC3E}">
+        <p14:creationId xmlns:p14="http://schemas.microsoft.com/office/powerpoint/2010/main" val="1563887306"/>
       </p:ext>
     </p:extLst>
   </p:cSld>
@@ -10031,6 +10160,61 @@
 </p:sld>
 </file>
 
+<file path=ppt/slides/slide4.xml><?xml version="1.0" encoding="utf-8"?>
+<p:sld xmlns:a="http://schemas.openxmlformats.org/drawingml/2006/main" xmlns:r="http://schemas.openxmlformats.org/officeDocument/2006/relationships" xmlns:p="http://schemas.openxmlformats.org/presentationml/2006/main">
+  <p:cSld>
+    <p:spTree>
+      <p:nvGrpSpPr>
+        <p:cNvPr id="1" name=""/>
+        <p:cNvGrpSpPr/>
+        <p:nvPr/>
+      </p:nvGrpSpPr>
+      <p:grpSpPr>
+        <a:xfrm>
+          <a:off x="0" y="0"/>
+          <a:ext cx="0" cy="0"/>
+          <a:chOff x="0" y="0"/>
+          <a:chExt cx="0" cy="0"/>
+        </a:xfrm>
+      </p:grpSpPr>
+      <p:sp>
+        <p:nvSpPr>
+          <p:cNvPr id="2" name="Subtitle 1">
+            <a:extLst>
+              <a:ext uri="{FF2B5EF4-FFF2-40B4-BE49-F238E27FC236}">
+                <a16:creationId xmlns:a16="http://schemas.microsoft.com/office/drawing/2014/main" id="{E8AE7DDA-A30C-4B2B-BA1E-2A50AD83521C}"/>
+              </a:ext>
+            </a:extLst>
+          </p:cNvPr>
+          <p:cNvSpPr>
+            <a:spLocks noGrp="1"/>
+          </p:cNvSpPr>
+          <p:nvPr>
+            <p:ph type="subTitle" idx="1"/>
+          </p:nvPr>
+        </p:nvSpPr>
+        <p:spPr/>
+        <p:txBody>
+          <a:bodyPr/>
+          <a:lstStyle/>
+          <a:p>
+            <a:endParaRPr lang="en-US"/>
+          </a:p>
+        </p:txBody>
+      </p:sp>
+    </p:spTree>
+    <p:extLst>
+      <p:ext uri="{BB962C8B-B14F-4D97-AF65-F5344CB8AC3E}">
+        <p14:creationId xmlns:p14="http://schemas.microsoft.com/office/powerpoint/2010/main" val="3212282185"/>
+      </p:ext>
+    </p:extLst>
+  </p:cSld>
+  <p:clrMapOvr>
+    <a:masterClrMapping/>
+  </p:clrMapOvr>
+</p:sld>
+</file>
+
 <file path=ppt/theme/theme1.xml><?xml version="1.0" encoding="utf-8"?>
 <a:theme xmlns:a="http://schemas.openxmlformats.org/drawingml/2006/main" name="Harmony">
   <a:themeElements>

</xml_diff>